<commit_message>
adding description big picture
</commit_message>
<xml_diff>
--- a/apimasters-2024/img/api-descriptions.pptx
+++ b/apimasters-2024/img/api-descriptions.pptx
@@ -5,10 +5,11 @@
     <p:sldMasterId id="2147483648" r:id="rId1"/>
   </p:sldMasterIdLst>
   <p:notesMasterIdLst>
-    <p:notesMasterId r:id="rId3"/>
+    <p:notesMasterId r:id="rId4"/>
   </p:notesMasterIdLst>
   <p:sldIdLst>
     <p:sldId id="256" r:id="rId2"/>
+    <p:sldId id="257" r:id="rId3"/>
   </p:sldIdLst>
   <p:sldSz cx="12192000" cy="6858000"/>
   <p:notesSz cx="6858000" cy="9144000"/>
@@ -197,7 +198,7 @@
           <a:p>
             <a:fld id="{F0FB17AE-ADEB-284A-B69B-76F228EF7FE2}" type="datetimeFigureOut">
               <a:rPr lang="en-CH" smtClean="0"/>
-              <a:t>09.07.2024</a:t>
+              <a:t>21.07.2024</a:t>
             </a:fld>
             <a:endParaRPr lang="en-CH"/>
           </a:p>
@@ -698,7 +699,7 @@
           <a:p>
             <a:fld id="{488DD562-4E1D-C446-BB00-DA16C3599FEB}" type="datetimeFigureOut">
               <a:rPr lang="en-CH" smtClean="0"/>
-              <a:t>09.07.2024</a:t>
+              <a:t>21.07.2024</a:t>
             </a:fld>
             <a:endParaRPr lang="en-CH"/>
           </a:p>
@@ -898,7 +899,7 @@
           <a:p>
             <a:fld id="{488DD562-4E1D-C446-BB00-DA16C3599FEB}" type="datetimeFigureOut">
               <a:rPr lang="en-CH" smtClean="0"/>
-              <a:t>09.07.2024</a:t>
+              <a:t>21.07.2024</a:t>
             </a:fld>
             <a:endParaRPr lang="en-CH"/>
           </a:p>
@@ -1108,7 +1109,7 @@
           <a:p>
             <a:fld id="{488DD562-4E1D-C446-BB00-DA16C3599FEB}" type="datetimeFigureOut">
               <a:rPr lang="en-CH" smtClean="0"/>
-              <a:t>09.07.2024</a:t>
+              <a:t>21.07.2024</a:t>
             </a:fld>
             <a:endParaRPr lang="en-CH"/>
           </a:p>
@@ -1308,7 +1309,7 @@
           <a:p>
             <a:fld id="{488DD562-4E1D-C446-BB00-DA16C3599FEB}" type="datetimeFigureOut">
               <a:rPr lang="en-CH" smtClean="0"/>
-              <a:t>09.07.2024</a:t>
+              <a:t>21.07.2024</a:t>
             </a:fld>
             <a:endParaRPr lang="en-CH"/>
           </a:p>
@@ -1584,7 +1585,7 @@
           <a:p>
             <a:fld id="{488DD562-4E1D-C446-BB00-DA16C3599FEB}" type="datetimeFigureOut">
               <a:rPr lang="en-CH" smtClean="0"/>
-              <a:t>09.07.2024</a:t>
+              <a:t>21.07.2024</a:t>
             </a:fld>
             <a:endParaRPr lang="en-CH"/>
           </a:p>
@@ -1852,7 +1853,7 @@
           <a:p>
             <a:fld id="{488DD562-4E1D-C446-BB00-DA16C3599FEB}" type="datetimeFigureOut">
               <a:rPr lang="en-CH" smtClean="0"/>
-              <a:t>09.07.2024</a:t>
+              <a:t>21.07.2024</a:t>
             </a:fld>
             <a:endParaRPr lang="en-CH"/>
           </a:p>
@@ -2267,7 +2268,7 @@
           <a:p>
             <a:fld id="{488DD562-4E1D-C446-BB00-DA16C3599FEB}" type="datetimeFigureOut">
               <a:rPr lang="en-CH" smtClean="0"/>
-              <a:t>09.07.2024</a:t>
+              <a:t>21.07.2024</a:t>
             </a:fld>
             <a:endParaRPr lang="en-CH"/>
           </a:p>
@@ -2409,7 +2410,7 @@
           <a:p>
             <a:fld id="{488DD562-4E1D-C446-BB00-DA16C3599FEB}" type="datetimeFigureOut">
               <a:rPr lang="en-CH" smtClean="0"/>
-              <a:t>09.07.2024</a:t>
+              <a:t>21.07.2024</a:t>
             </a:fld>
             <a:endParaRPr lang="en-CH"/>
           </a:p>
@@ -2522,7 +2523,7 @@
           <a:p>
             <a:fld id="{488DD562-4E1D-C446-BB00-DA16C3599FEB}" type="datetimeFigureOut">
               <a:rPr lang="en-CH" smtClean="0"/>
-              <a:t>09.07.2024</a:t>
+              <a:t>21.07.2024</a:t>
             </a:fld>
             <a:endParaRPr lang="en-CH"/>
           </a:p>
@@ -2835,7 +2836,7 @@
           <a:p>
             <a:fld id="{488DD562-4E1D-C446-BB00-DA16C3599FEB}" type="datetimeFigureOut">
               <a:rPr lang="en-CH" smtClean="0"/>
-              <a:t>09.07.2024</a:t>
+              <a:t>21.07.2024</a:t>
             </a:fld>
             <a:endParaRPr lang="en-CH"/>
           </a:p>
@@ -3124,7 +3125,7 @@
           <a:p>
             <a:fld id="{488DD562-4E1D-C446-BB00-DA16C3599FEB}" type="datetimeFigureOut">
               <a:rPr lang="en-CH" smtClean="0"/>
-              <a:t>09.07.2024</a:t>
+              <a:t>21.07.2024</a:t>
             </a:fld>
             <a:endParaRPr lang="en-CH"/>
           </a:p>
@@ -3367,7 +3368,7 @@
           <a:p>
             <a:fld id="{488DD562-4E1D-C446-BB00-DA16C3599FEB}" type="datetimeFigureOut">
               <a:rPr lang="en-CH" smtClean="0"/>
-              <a:t>09.07.2024</a:t>
+              <a:t>21.07.2024</a:t>
             </a:fld>
             <a:endParaRPr lang="en-CH"/>
           </a:p>
@@ -4904,6 +4905,656 @@
     <p:extLst>
       <p:ext uri="{BB962C8B-B14F-4D97-AF65-F5344CB8AC3E}">
         <p14:creationId xmlns:p14="http://schemas.microsoft.com/office/powerpoint/2010/main" val="2050905065"/>
+      </p:ext>
+    </p:extLst>
+  </p:cSld>
+  <p:clrMapOvr>
+    <a:masterClrMapping/>
+  </p:clrMapOvr>
+</p:sld>
+</file>
+
+<file path=ppt/slides/slide2.xml><?xml version="1.0" encoding="utf-8"?>
+<p:sld xmlns:a="http://schemas.openxmlformats.org/drawingml/2006/main" xmlns:r="http://schemas.openxmlformats.org/officeDocument/2006/relationships" xmlns:p="http://schemas.openxmlformats.org/presentationml/2006/main">
+  <p:cSld>
+    <p:spTree>
+      <p:nvGrpSpPr>
+        <p:cNvPr id="1" name=""/>
+        <p:cNvGrpSpPr/>
+        <p:nvPr/>
+      </p:nvGrpSpPr>
+      <p:grpSpPr>
+        <a:xfrm>
+          <a:off x="0" y="0"/>
+          <a:ext cx="0" cy="0"/>
+          <a:chOff x="0" y="0"/>
+          <a:chExt cx="0" cy="0"/>
+        </a:xfrm>
+      </p:grpSpPr>
+      <p:sp>
+        <p:nvSpPr>
+          <p:cNvPr id="2" name="Rectangle 1">
+            <a:extLst>
+              <a:ext uri="{FF2B5EF4-FFF2-40B4-BE49-F238E27FC236}">
+                <a16:creationId xmlns:a16="http://schemas.microsoft.com/office/drawing/2014/main" id="{B342C5EF-36E1-AB31-E5E1-18BAF6D9775E}"/>
+              </a:ext>
+            </a:extLst>
+          </p:cNvPr>
+          <p:cNvSpPr/>
+          <p:nvPr/>
+        </p:nvSpPr>
+        <p:spPr>
+          <a:xfrm>
+            <a:off x="1418893" y="996883"/>
+            <a:ext cx="2427889" cy="1114096"/>
+          </a:xfrm>
+          <a:prstGeom prst="rect">
+            <a:avLst/>
+          </a:prstGeom>
+        </p:spPr>
+        <p:style>
+          <a:lnRef idx="2">
+            <a:schemeClr val="accent1">
+              <a:shade val="15000"/>
+            </a:schemeClr>
+          </a:lnRef>
+          <a:fillRef idx="1">
+            <a:schemeClr val="accent1"/>
+          </a:fillRef>
+          <a:effectRef idx="0">
+            <a:schemeClr val="accent1"/>
+          </a:effectRef>
+          <a:fontRef idx="minor">
+            <a:schemeClr val="lt1"/>
+          </a:fontRef>
+        </p:style>
+        <p:txBody>
+          <a:bodyPr rtlCol="0" anchor="ctr"/>
+          <a:lstStyle/>
+          <a:p>
+            <a:pPr algn="ctr"/>
+            <a:r>
+              <a:rPr lang="en-CH" sz="2400" dirty="0">
+                <a:latin typeface="Ford Antenna Medium" panose="02000505000000020004" pitchFamily="2" charset="0"/>
+              </a:rPr>
+              <a:t>Consumer</a:t>
+            </a:r>
+          </a:p>
+        </p:txBody>
+      </p:sp>
+      <p:sp>
+        <p:nvSpPr>
+          <p:cNvPr id="3" name="Rectangle 2">
+            <a:extLst>
+              <a:ext uri="{FF2B5EF4-FFF2-40B4-BE49-F238E27FC236}">
+                <a16:creationId xmlns:a16="http://schemas.microsoft.com/office/drawing/2014/main" id="{CA10BE12-84EA-2E30-2EF9-EE629B2E31F4}"/>
+              </a:ext>
+            </a:extLst>
+          </p:cNvPr>
+          <p:cNvSpPr/>
+          <p:nvPr/>
+        </p:nvSpPr>
+        <p:spPr>
+          <a:xfrm>
+            <a:off x="1418895" y="2871952"/>
+            <a:ext cx="2427889" cy="1114096"/>
+          </a:xfrm>
+          <a:prstGeom prst="rect">
+            <a:avLst/>
+          </a:prstGeom>
+        </p:spPr>
+        <p:style>
+          <a:lnRef idx="2">
+            <a:schemeClr val="accent1">
+              <a:shade val="15000"/>
+            </a:schemeClr>
+          </a:lnRef>
+          <a:fillRef idx="1">
+            <a:schemeClr val="accent1"/>
+          </a:fillRef>
+          <a:effectRef idx="0">
+            <a:schemeClr val="accent1"/>
+          </a:effectRef>
+          <a:fontRef idx="minor">
+            <a:schemeClr val="lt1"/>
+          </a:fontRef>
+        </p:style>
+        <p:txBody>
+          <a:bodyPr rtlCol="0" anchor="ctr"/>
+          <a:lstStyle/>
+          <a:p>
+            <a:pPr algn="ctr"/>
+            <a:r>
+              <a:rPr lang="en-CH" sz="2400" dirty="0">
+                <a:latin typeface="Ford Antenna Medium" panose="02000505000000020004" pitchFamily="2" charset="0"/>
+              </a:rPr>
+              <a:t>API</a:t>
+            </a:r>
+          </a:p>
+        </p:txBody>
+      </p:sp>
+      <p:sp>
+        <p:nvSpPr>
+          <p:cNvPr id="4" name="Rectangle 3">
+            <a:extLst>
+              <a:ext uri="{FF2B5EF4-FFF2-40B4-BE49-F238E27FC236}">
+                <a16:creationId xmlns:a16="http://schemas.microsoft.com/office/drawing/2014/main" id="{34815B4C-3B4D-6CA8-5B1A-5F7BA28DE524}"/>
+              </a:ext>
+            </a:extLst>
+          </p:cNvPr>
+          <p:cNvSpPr/>
+          <p:nvPr/>
+        </p:nvSpPr>
+        <p:spPr>
+          <a:xfrm>
+            <a:off x="5533695" y="2871952"/>
+            <a:ext cx="2427889" cy="1114096"/>
+          </a:xfrm>
+          <a:prstGeom prst="rect">
+            <a:avLst/>
+          </a:prstGeom>
+        </p:spPr>
+        <p:style>
+          <a:lnRef idx="2">
+            <a:schemeClr val="accent1">
+              <a:shade val="15000"/>
+            </a:schemeClr>
+          </a:lnRef>
+          <a:fillRef idx="1">
+            <a:schemeClr val="accent1"/>
+          </a:fillRef>
+          <a:effectRef idx="0">
+            <a:schemeClr val="accent1"/>
+          </a:effectRef>
+          <a:fontRef idx="minor">
+            <a:schemeClr val="lt1"/>
+          </a:fontRef>
+        </p:style>
+        <p:txBody>
+          <a:bodyPr rtlCol="0" anchor="ctr"/>
+          <a:lstStyle/>
+          <a:p>
+            <a:pPr algn="ctr"/>
+            <a:r>
+              <a:rPr lang="en-CH" sz="2400" dirty="0">
+                <a:latin typeface="Ford Antenna Medium" panose="02000505000000020004" pitchFamily="2" charset="0"/>
+              </a:rPr>
+              <a:t>API</a:t>
+            </a:r>
+          </a:p>
+          <a:p>
+            <a:pPr algn="ctr"/>
+            <a:r>
+              <a:rPr lang="en-CH" sz="2400" dirty="0">
+                <a:latin typeface="Ford Antenna Medium" panose="02000505000000020004" pitchFamily="2" charset="0"/>
+              </a:rPr>
+              <a:t>Description</a:t>
+            </a:r>
+          </a:p>
+        </p:txBody>
+      </p:sp>
+      <p:pic>
+        <p:nvPicPr>
+          <p:cNvPr id="5" name="Picture 4">
+            <a:extLst>
+              <a:ext uri="{FF2B5EF4-FFF2-40B4-BE49-F238E27FC236}">
+                <a16:creationId xmlns:a16="http://schemas.microsoft.com/office/drawing/2014/main" id="{02D84163-54BF-1A41-39D5-8E144E1AF3FB}"/>
+              </a:ext>
+            </a:extLst>
+          </p:cNvPr>
+          <p:cNvPicPr>
+            <a:picLocks noChangeAspect="1"/>
+          </p:cNvPicPr>
+          <p:nvPr/>
+        </p:nvPicPr>
+        <p:blipFill>
+          <a:blip r:embed="rId2"/>
+          <a:stretch>
+            <a:fillRect/>
+          </a:stretch>
+        </p:blipFill>
+        <p:spPr>
+          <a:xfrm>
+            <a:off x="5528642" y="1191586"/>
+            <a:ext cx="2427880" cy="759764"/>
+          </a:xfrm>
+          <a:prstGeom prst="rect">
+            <a:avLst/>
+          </a:prstGeom>
+        </p:spPr>
+      </p:pic>
+      <p:cxnSp>
+        <p:nvCxnSpPr>
+          <p:cNvPr id="6" name="Straight Arrow Connector 5">
+            <a:extLst>
+              <a:ext uri="{FF2B5EF4-FFF2-40B4-BE49-F238E27FC236}">
+                <a16:creationId xmlns:a16="http://schemas.microsoft.com/office/drawing/2014/main" id="{075F3483-BC8A-50BB-14CC-95982A962667}"/>
+              </a:ext>
+            </a:extLst>
+          </p:cNvPr>
+          <p:cNvCxnSpPr>
+            <a:cxnSpLocks/>
+          </p:cNvCxnSpPr>
+          <p:nvPr/>
+        </p:nvCxnSpPr>
+        <p:spPr>
+          <a:xfrm>
+            <a:off x="4117271" y="1553931"/>
+            <a:ext cx="1182326" cy="0"/>
+          </a:xfrm>
+          <a:prstGeom prst="straightConnector1">
+            <a:avLst/>
+          </a:prstGeom>
+          <a:ln w="63500">
+            <a:tailEnd type="triangle" w="med" len="lg"/>
+          </a:ln>
+        </p:spPr>
+        <p:style>
+          <a:lnRef idx="2">
+            <a:schemeClr val="accent1"/>
+          </a:lnRef>
+          <a:fillRef idx="0">
+            <a:schemeClr val="accent1"/>
+          </a:fillRef>
+          <a:effectRef idx="1">
+            <a:schemeClr val="accent1"/>
+          </a:effectRef>
+          <a:fontRef idx="minor">
+            <a:schemeClr val="tx1"/>
+          </a:fontRef>
+        </p:style>
+      </p:cxnSp>
+      <p:cxnSp>
+        <p:nvCxnSpPr>
+          <p:cNvPr id="7" name="Straight Arrow Connector 6">
+            <a:extLst>
+              <a:ext uri="{FF2B5EF4-FFF2-40B4-BE49-F238E27FC236}">
+                <a16:creationId xmlns:a16="http://schemas.microsoft.com/office/drawing/2014/main" id="{51CA1396-E191-678C-3EC2-ED9C15B03482}"/>
+              </a:ext>
+            </a:extLst>
+          </p:cNvPr>
+          <p:cNvCxnSpPr>
+            <a:cxnSpLocks/>
+          </p:cNvCxnSpPr>
+          <p:nvPr/>
+        </p:nvCxnSpPr>
+        <p:spPr>
+          <a:xfrm flipV="1">
+            <a:off x="6759638" y="2043951"/>
+            <a:ext cx="0" cy="595364"/>
+          </a:xfrm>
+          <a:prstGeom prst="straightConnector1">
+            <a:avLst/>
+          </a:prstGeom>
+          <a:ln w="63500">
+            <a:tailEnd type="triangle" w="med" len="lg"/>
+          </a:ln>
+        </p:spPr>
+        <p:style>
+          <a:lnRef idx="2">
+            <a:schemeClr val="accent1"/>
+          </a:lnRef>
+          <a:fillRef idx="0">
+            <a:schemeClr val="accent1"/>
+          </a:fillRef>
+          <a:effectRef idx="1">
+            <a:schemeClr val="accent1"/>
+          </a:effectRef>
+          <a:fontRef idx="minor">
+            <a:schemeClr val="tx1"/>
+          </a:fontRef>
+        </p:style>
+      </p:cxnSp>
+      <p:cxnSp>
+        <p:nvCxnSpPr>
+          <p:cNvPr id="8" name="Straight Arrow Connector 7">
+            <a:extLst>
+              <a:ext uri="{FF2B5EF4-FFF2-40B4-BE49-F238E27FC236}">
+                <a16:creationId xmlns:a16="http://schemas.microsoft.com/office/drawing/2014/main" id="{DB56DE54-77D8-7264-C75A-F601C462FF99}"/>
+              </a:ext>
+            </a:extLst>
+          </p:cNvPr>
+          <p:cNvCxnSpPr>
+            <a:cxnSpLocks/>
+          </p:cNvCxnSpPr>
+          <p:nvPr/>
+        </p:nvCxnSpPr>
+        <p:spPr>
+          <a:xfrm>
+            <a:off x="4093780" y="1878261"/>
+            <a:ext cx="1182326" cy="761054"/>
+          </a:xfrm>
+          <a:prstGeom prst="straightConnector1">
+            <a:avLst/>
+          </a:prstGeom>
+          <a:ln w="63500">
+            <a:tailEnd type="triangle" w="med" len="lg"/>
+          </a:ln>
+        </p:spPr>
+        <p:style>
+          <a:lnRef idx="2">
+            <a:schemeClr val="accent1"/>
+          </a:lnRef>
+          <a:fillRef idx="0">
+            <a:schemeClr val="accent1"/>
+          </a:fillRef>
+          <a:effectRef idx="1">
+            <a:schemeClr val="accent1"/>
+          </a:effectRef>
+          <a:fontRef idx="minor">
+            <a:schemeClr val="tx1"/>
+          </a:fontRef>
+        </p:style>
+      </p:cxnSp>
+      <p:cxnSp>
+        <p:nvCxnSpPr>
+          <p:cNvPr id="9" name="Straight Arrow Connector 8">
+            <a:extLst>
+              <a:ext uri="{FF2B5EF4-FFF2-40B4-BE49-F238E27FC236}">
+                <a16:creationId xmlns:a16="http://schemas.microsoft.com/office/drawing/2014/main" id="{A4CF32EE-E2AB-A049-EBE4-00844FB15CAB}"/>
+              </a:ext>
+            </a:extLst>
+          </p:cNvPr>
+          <p:cNvCxnSpPr>
+            <a:cxnSpLocks/>
+          </p:cNvCxnSpPr>
+          <p:nvPr/>
+        </p:nvCxnSpPr>
+        <p:spPr>
+          <a:xfrm flipH="1">
+            <a:off x="4093780" y="3429000"/>
+            <a:ext cx="1157987" cy="0"/>
+          </a:xfrm>
+          <a:prstGeom prst="straightConnector1">
+            <a:avLst/>
+          </a:prstGeom>
+          <a:ln w="63500">
+            <a:tailEnd type="triangle" w="med" len="lg"/>
+          </a:ln>
+        </p:spPr>
+        <p:style>
+          <a:lnRef idx="2">
+            <a:schemeClr val="accent1"/>
+          </a:lnRef>
+          <a:fillRef idx="0">
+            <a:schemeClr val="accent1"/>
+          </a:fillRef>
+          <a:effectRef idx="1">
+            <a:schemeClr val="accent1"/>
+          </a:effectRef>
+          <a:fontRef idx="minor">
+            <a:schemeClr val="tx1"/>
+          </a:fontRef>
+        </p:style>
+      </p:cxnSp>
+      <p:cxnSp>
+        <p:nvCxnSpPr>
+          <p:cNvPr id="10" name="Straight Arrow Connector 9">
+            <a:extLst>
+              <a:ext uri="{FF2B5EF4-FFF2-40B4-BE49-F238E27FC236}">
+                <a16:creationId xmlns:a16="http://schemas.microsoft.com/office/drawing/2014/main" id="{C43E9839-862D-7A08-8247-E1318A56163F}"/>
+              </a:ext>
+            </a:extLst>
+          </p:cNvPr>
+          <p:cNvCxnSpPr>
+            <a:cxnSpLocks/>
+          </p:cNvCxnSpPr>
+          <p:nvPr/>
+        </p:nvCxnSpPr>
+        <p:spPr>
+          <a:xfrm flipV="1">
+            <a:off x="2779410" y="2246366"/>
+            <a:ext cx="0" cy="485305"/>
+          </a:xfrm>
+          <a:prstGeom prst="straightConnector1">
+            <a:avLst/>
+          </a:prstGeom>
+          <a:ln w="63500">
+            <a:headEnd type="triangle" w="med" len="lg"/>
+            <a:tailEnd type="none" w="med" len="lg"/>
+          </a:ln>
+        </p:spPr>
+        <p:style>
+          <a:lnRef idx="2">
+            <a:schemeClr val="accent1"/>
+          </a:lnRef>
+          <a:fillRef idx="0">
+            <a:schemeClr val="accent1"/>
+          </a:fillRef>
+          <a:effectRef idx="1">
+            <a:schemeClr val="accent1"/>
+          </a:effectRef>
+          <a:fontRef idx="minor">
+            <a:schemeClr val="tx1"/>
+          </a:fontRef>
+        </p:style>
+      </p:cxnSp>
+      <p:cxnSp>
+        <p:nvCxnSpPr>
+          <p:cNvPr id="11" name="Straight Arrow Connector 10">
+            <a:extLst>
+              <a:ext uri="{FF2B5EF4-FFF2-40B4-BE49-F238E27FC236}">
+                <a16:creationId xmlns:a16="http://schemas.microsoft.com/office/drawing/2014/main" id="{7E55C625-322D-7C93-0805-E9E3E7061917}"/>
+              </a:ext>
+            </a:extLst>
+          </p:cNvPr>
+          <p:cNvCxnSpPr>
+            <a:cxnSpLocks/>
+          </p:cNvCxnSpPr>
+          <p:nvPr/>
+        </p:nvCxnSpPr>
+        <p:spPr>
+          <a:xfrm>
+            <a:off x="2418736" y="2222726"/>
+            <a:ext cx="0" cy="485305"/>
+          </a:xfrm>
+          <a:prstGeom prst="straightConnector1">
+            <a:avLst/>
+          </a:prstGeom>
+          <a:ln w="63500">
+            <a:headEnd type="triangle" w="med" len="lg"/>
+            <a:tailEnd type="none" w="med" len="lg"/>
+          </a:ln>
+        </p:spPr>
+        <p:style>
+          <a:lnRef idx="2">
+            <a:schemeClr val="accent1"/>
+          </a:lnRef>
+          <a:fillRef idx="0">
+            <a:schemeClr val="accent1"/>
+          </a:fillRef>
+          <a:effectRef idx="1">
+            <a:schemeClr val="accent1"/>
+          </a:effectRef>
+          <a:fontRef idx="minor">
+            <a:schemeClr val="tx1"/>
+          </a:fontRef>
+        </p:style>
+      </p:cxnSp>
+      <p:sp>
+        <p:nvSpPr>
+          <p:cNvPr id="14" name="TextBox 13">
+            <a:extLst>
+              <a:ext uri="{FF2B5EF4-FFF2-40B4-BE49-F238E27FC236}">
+                <a16:creationId xmlns:a16="http://schemas.microsoft.com/office/drawing/2014/main" id="{5FE92EA7-11F6-21CB-CE49-F8BA2B53B4E7}"/>
+              </a:ext>
+            </a:extLst>
+          </p:cNvPr>
+          <p:cNvSpPr txBox="1"/>
+          <p:nvPr/>
+        </p:nvSpPr>
+        <p:spPr>
+          <a:xfrm>
+            <a:off x="4436763" y="3593010"/>
+            <a:ext cx="543339" cy="461665"/>
+          </a:xfrm>
+          <a:prstGeom prst="rect">
+            <a:avLst/>
+          </a:prstGeom>
+          <a:noFill/>
+        </p:spPr>
+        <p:txBody>
+          <a:bodyPr wrap="square">
+            <a:spAutoFit/>
+          </a:bodyPr>
+          <a:lstStyle/>
+          <a:p>
+            <a:r>
+              <a:rPr lang="en-CH" sz="2400" dirty="0">
+                <a:solidFill>
+                  <a:schemeClr val="accent1"/>
+                </a:solidFill>
+                <a:latin typeface="Ford Antenna Medium" panose="02000505000000020004" pitchFamily="2" charset="0"/>
+              </a:rPr>
+              <a:t>①</a:t>
+            </a:r>
+            <a:endParaRPr lang="en-CH" sz="2400" dirty="0">
+              <a:solidFill>
+                <a:schemeClr val="accent1"/>
+              </a:solidFill>
+            </a:endParaRPr>
+          </a:p>
+        </p:txBody>
+      </p:sp>
+      <p:sp>
+        <p:nvSpPr>
+          <p:cNvPr id="15" name="TextBox 14">
+            <a:extLst>
+              <a:ext uri="{FF2B5EF4-FFF2-40B4-BE49-F238E27FC236}">
+                <a16:creationId xmlns:a16="http://schemas.microsoft.com/office/drawing/2014/main" id="{38F33F04-4318-10D2-72F6-A32D6F1646C4}"/>
+              </a:ext>
+            </a:extLst>
+          </p:cNvPr>
+          <p:cNvSpPr txBox="1"/>
+          <p:nvPr/>
+        </p:nvSpPr>
+        <p:spPr>
+          <a:xfrm>
+            <a:off x="6951149" y="2110979"/>
+            <a:ext cx="477078" cy="461665"/>
+          </a:xfrm>
+          <a:prstGeom prst="rect">
+            <a:avLst/>
+          </a:prstGeom>
+          <a:noFill/>
+        </p:spPr>
+        <p:txBody>
+          <a:bodyPr wrap="square">
+            <a:spAutoFit/>
+          </a:bodyPr>
+          <a:lstStyle/>
+          <a:p>
+            <a:r>
+              <a:rPr lang="en-CH" sz="2400" dirty="0">
+                <a:solidFill>
+                  <a:schemeClr val="accent1"/>
+                </a:solidFill>
+                <a:latin typeface="Ford Antenna Medium" panose="02000505000000020004" pitchFamily="2" charset="0"/>
+              </a:rPr>
+              <a:t>②</a:t>
+            </a:r>
+            <a:endParaRPr lang="en-CH" sz="2400" dirty="0">
+              <a:solidFill>
+                <a:schemeClr val="accent1"/>
+              </a:solidFill>
+            </a:endParaRPr>
+          </a:p>
+        </p:txBody>
+      </p:sp>
+      <p:sp>
+        <p:nvSpPr>
+          <p:cNvPr id="16" name="TextBox 15">
+            <a:extLst>
+              <a:ext uri="{FF2B5EF4-FFF2-40B4-BE49-F238E27FC236}">
+                <a16:creationId xmlns:a16="http://schemas.microsoft.com/office/drawing/2014/main" id="{FFC342CF-AF4D-367E-F0CA-0EFCE65CED41}"/>
+              </a:ext>
+            </a:extLst>
+          </p:cNvPr>
+          <p:cNvSpPr txBox="1"/>
+          <p:nvPr/>
+        </p:nvSpPr>
+        <p:spPr>
+          <a:xfrm>
+            <a:off x="4404406" y="960753"/>
+            <a:ext cx="608054" cy="461665"/>
+          </a:xfrm>
+          <a:prstGeom prst="rect">
+            <a:avLst/>
+          </a:prstGeom>
+          <a:noFill/>
+        </p:spPr>
+        <p:txBody>
+          <a:bodyPr wrap="square">
+            <a:spAutoFit/>
+          </a:bodyPr>
+          <a:lstStyle/>
+          <a:p>
+            <a:r>
+              <a:rPr lang="en-CH" sz="2400" dirty="0">
+                <a:solidFill>
+                  <a:schemeClr val="accent1"/>
+                </a:solidFill>
+                <a:latin typeface="Ford Antenna Medium" panose="02000505000000020004" pitchFamily="2" charset="0"/>
+              </a:rPr>
+              <a:t>③</a:t>
+            </a:r>
+            <a:endParaRPr lang="en-CH" sz="2400" dirty="0">
+              <a:solidFill>
+                <a:schemeClr val="accent1"/>
+              </a:solidFill>
+            </a:endParaRPr>
+          </a:p>
+        </p:txBody>
+      </p:sp>
+      <p:sp>
+        <p:nvSpPr>
+          <p:cNvPr id="17" name="TextBox 16">
+            <a:extLst>
+              <a:ext uri="{FF2B5EF4-FFF2-40B4-BE49-F238E27FC236}">
+                <a16:creationId xmlns:a16="http://schemas.microsoft.com/office/drawing/2014/main" id="{FA9265AA-C1F2-3FC6-9915-32E7BBA2DD7C}"/>
+              </a:ext>
+            </a:extLst>
+          </p:cNvPr>
+          <p:cNvSpPr txBox="1"/>
+          <p:nvPr/>
+        </p:nvSpPr>
+        <p:spPr>
+          <a:xfrm>
+            <a:off x="4161407" y="2341660"/>
+            <a:ext cx="477078" cy="461665"/>
+          </a:xfrm>
+          <a:prstGeom prst="rect">
+            <a:avLst/>
+          </a:prstGeom>
+          <a:noFill/>
+        </p:spPr>
+        <p:txBody>
+          <a:bodyPr wrap="square">
+            <a:spAutoFit/>
+          </a:bodyPr>
+          <a:lstStyle/>
+          <a:p>
+            <a:r>
+              <a:rPr lang="en-CH" sz="2400" dirty="0">
+                <a:solidFill>
+                  <a:schemeClr val="accent1"/>
+                </a:solidFill>
+                <a:latin typeface="Ford Antenna Medium" panose="02000505000000020004" pitchFamily="2" charset="0"/>
+              </a:rPr>
+              <a:t>④</a:t>
+            </a:r>
+            <a:endParaRPr lang="en-CH" sz="2400" dirty="0">
+              <a:solidFill>
+                <a:schemeClr val="accent1"/>
+              </a:solidFill>
+            </a:endParaRPr>
+          </a:p>
+        </p:txBody>
+      </p:sp>
+    </p:spTree>
+    <p:extLst>
+      <p:ext uri="{BB962C8B-B14F-4D97-AF65-F5344CB8AC3E}">
+        <p14:creationId xmlns:p14="http://schemas.microsoft.com/office/powerpoint/2010/main" val="727090756"/>
       </p:ext>
     </p:extLst>
   </p:cSld>

</xml_diff>